<commit_message>
:hammer: CD 발표 자료 수정
</commit_message>
<xml_diff>
--- a/10th Node/Ten-min-Seminar/21.02.20 Continuous Deploy/Continuous Deployment.pptx
+++ b/10th Node/Ten-min-Seminar/21.02.20 Continuous Deploy/Continuous Deployment.pptx
@@ -231,7 +231,7 @@
           <a:p>
             <a:fld id="{72B1295F-8928-3248-B4B2-B95492A9B999}" type="datetimeFigureOut">
               <a:rPr kumimoji="1" lang="ko-Kore-KR" altLang="en-US" smtClean="0"/>
-              <a:t>2021. 2. 20.</a:t>
+              <a:t>2021. 2. 21.</a:t>
             </a:fld>
             <a:endParaRPr kumimoji="1" lang="ko-Kore-KR" altLang="en-US"/>
           </a:p>
@@ -712,7 +712,7 @@
           <a:p>
             <a:fld id="{974660E2-A8B9-44CC-9E7C-52ADA9560240}" type="datetimeFigureOut">
               <a:rPr lang="ko-KR" altLang="en-US" smtClean="0"/>
-              <a:t>2021. 2. 20.</a:t>
+              <a:t>2021. 2. 21.</a:t>
             </a:fld>
             <a:endParaRPr lang="ko-KR" altLang="en-US"/>
           </a:p>
@@ -880,7 +880,7 @@
           <a:p>
             <a:fld id="{974660E2-A8B9-44CC-9E7C-52ADA9560240}" type="datetimeFigureOut">
               <a:rPr lang="ko-KR" altLang="en-US" smtClean="0"/>
-              <a:t>2021. 2. 20.</a:t>
+              <a:t>2021. 2. 21.</a:t>
             </a:fld>
             <a:endParaRPr lang="ko-KR" altLang="en-US"/>
           </a:p>
@@ -1058,7 +1058,7 @@
           <a:p>
             <a:fld id="{974660E2-A8B9-44CC-9E7C-52ADA9560240}" type="datetimeFigureOut">
               <a:rPr lang="ko-KR" altLang="en-US" smtClean="0"/>
-              <a:t>2021. 2. 20.</a:t>
+              <a:t>2021. 2. 21.</a:t>
             </a:fld>
             <a:endParaRPr lang="ko-KR" altLang="en-US"/>
           </a:p>
@@ -1226,7 +1226,7 @@
           <a:p>
             <a:fld id="{974660E2-A8B9-44CC-9E7C-52ADA9560240}" type="datetimeFigureOut">
               <a:rPr lang="ko-KR" altLang="en-US" smtClean="0"/>
-              <a:t>2021. 2. 20.</a:t>
+              <a:t>2021. 2. 21.</a:t>
             </a:fld>
             <a:endParaRPr lang="ko-KR" altLang="en-US"/>
           </a:p>
@@ -1471,7 +1471,7 @@
           <a:p>
             <a:fld id="{974660E2-A8B9-44CC-9E7C-52ADA9560240}" type="datetimeFigureOut">
               <a:rPr lang="ko-KR" altLang="en-US" smtClean="0"/>
-              <a:t>2021. 2. 20.</a:t>
+              <a:t>2021. 2. 21.</a:t>
             </a:fld>
             <a:endParaRPr lang="ko-KR" altLang="en-US"/>
           </a:p>
@@ -1700,7 +1700,7 @@
           <a:p>
             <a:fld id="{974660E2-A8B9-44CC-9E7C-52ADA9560240}" type="datetimeFigureOut">
               <a:rPr lang="ko-KR" altLang="en-US" smtClean="0"/>
-              <a:t>2021. 2. 20.</a:t>
+              <a:t>2021. 2. 21.</a:t>
             </a:fld>
             <a:endParaRPr lang="ko-KR" altLang="en-US"/>
           </a:p>
@@ -2064,7 +2064,7 @@
           <a:p>
             <a:fld id="{974660E2-A8B9-44CC-9E7C-52ADA9560240}" type="datetimeFigureOut">
               <a:rPr lang="ko-KR" altLang="en-US" smtClean="0"/>
-              <a:t>2021. 2. 20.</a:t>
+              <a:t>2021. 2. 21.</a:t>
             </a:fld>
             <a:endParaRPr lang="ko-KR" altLang="en-US"/>
           </a:p>
@@ -2181,7 +2181,7 @@
           <a:p>
             <a:fld id="{974660E2-A8B9-44CC-9E7C-52ADA9560240}" type="datetimeFigureOut">
               <a:rPr lang="ko-KR" altLang="en-US" smtClean="0"/>
-              <a:t>2021. 2. 20.</a:t>
+              <a:t>2021. 2. 21.</a:t>
             </a:fld>
             <a:endParaRPr lang="ko-KR" altLang="en-US"/>
           </a:p>
@@ -2276,7 +2276,7 @@
           <a:p>
             <a:fld id="{974660E2-A8B9-44CC-9E7C-52ADA9560240}" type="datetimeFigureOut">
               <a:rPr lang="ko-KR" altLang="en-US" smtClean="0"/>
-              <a:t>2021. 2. 20.</a:t>
+              <a:t>2021. 2. 21.</a:t>
             </a:fld>
             <a:endParaRPr lang="ko-KR" altLang="en-US"/>
           </a:p>
@@ -2551,7 +2551,7 @@
           <a:p>
             <a:fld id="{974660E2-A8B9-44CC-9E7C-52ADA9560240}" type="datetimeFigureOut">
               <a:rPr lang="ko-KR" altLang="en-US" smtClean="0"/>
-              <a:t>2021. 2. 20.</a:t>
+              <a:t>2021. 2. 21.</a:t>
             </a:fld>
             <a:endParaRPr lang="ko-KR" altLang="en-US"/>
           </a:p>
@@ -2803,7 +2803,7 @@
           <a:p>
             <a:fld id="{974660E2-A8B9-44CC-9E7C-52ADA9560240}" type="datetimeFigureOut">
               <a:rPr lang="ko-KR" altLang="en-US" smtClean="0"/>
-              <a:t>2021. 2. 20.</a:t>
+              <a:t>2021. 2. 21.</a:t>
             </a:fld>
             <a:endParaRPr lang="ko-KR" altLang="en-US"/>
           </a:p>
@@ -3014,7 +3014,7 @@
           <a:p>
             <a:fld id="{974660E2-A8B9-44CC-9E7C-52ADA9560240}" type="datetimeFigureOut">
               <a:rPr lang="ko-KR" altLang="en-US" smtClean="0"/>
-              <a:t>2021. 2. 20.</a:t>
+              <a:t>2021. 2. 21.</a:t>
             </a:fld>
             <a:endParaRPr lang="ko-KR" altLang="en-US"/>
           </a:p>
@@ -6963,7 +6963,7 @@
         <p:spPr>
           <a:xfrm>
             <a:off x="3890998" y="3782869"/>
-            <a:ext cx="4410004" cy="646331"/>
+            <a:ext cx="4410004" cy="1200329"/>
           </a:xfrm>
           <a:prstGeom prst="rect">
             <a:avLst/>
@@ -6982,7 +6982,21 @@
                 <a:latin typeface="BM HANNA Pro OTF" panose="020B0600000101010101" pitchFamily="34" charset="-127"/>
                 <a:ea typeface="BM HANNA Pro OTF" panose="020B0600000101010101" pitchFamily="34" charset="-127"/>
               </a:rPr>
-              <a:t>빌드한 압축 파일 전달</a:t>
+              <a:t>빌드한</a:t>
+            </a:r>
+            <a:endParaRPr lang="en-US" altLang="ko-KR" sz="3600" dirty="0">
+              <a:latin typeface="BM HANNA Pro OTF" panose="020B0600000101010101" pitchFamily="34" charset="-127"/>
+              <a:ea typeface="BM HANNA Pro OTF" panose="020B0600000101010101" pitchFamily="34" charset="-127"/>
+            </a:endParaRPr>
+          </a:p>
+          <a:p>
+            <a:pPr algn="ctr"/>
+            <a:r>
+              <a:rPr lang="ko-KR" altLang="en-US" sz="3600" dirty="0">
+                <a:latin typeface="BM HANNA Pro OTF" panose="020B0600000101010101" pitchFamily="34" charset="-127"/>
+                <a:ea typeface="BM HANNA Pro OTF" panose="020B0600000101010101" pitchFamily="34" charset="-127"/>
+              </a:rPr>
+              <a:t>압축 파일 업로드</a:t>
             </a:r>
             <a:endParaRPr lang="en-US" altLang="ko-KR" sz="3600" dirty="0">
               <a:latin typeface="BM HANNA Pro OTF" panose="020B0600000101010101" pitchFamily="34" charset="-127"/>
@@ -7067,10 +7081,89 @@
       </p:grpSpPr>
       <p:sp>
         <p:nvSpPr>
-          <p:cNvPr id="11" name="타원 10">
+          <p:cNvPr id="4" name="TextBox 3"/>
+          <p:cNvSpPr txBox="1"/>
+          <p:nvPr/>
+        </p:nvSpPr>
+        <p:spPr>
+          <a:xfrm>
+            <a:off x="624253" y="571501"/>
+            <a:ext cx="3837910" cy="584775"/>
+          </a:xfrm>
+          <a:prstGeom prst="rect">
+            <a:avLst/>
+          </a:prstGeom>
+          <a:noFill/>
+        </p:spPr>
+        <p:txBody>
+          <a:bodyPr wrap="none" rtlCol="0">
+            <a:spAutoFit/>
+          </a:bodyPr>
+          <a:lstStyle/>
+          <a:p>
+            <a:r>
+              <a:rPr lang="en-US" altLang="ko-KR" sz="3200" dirty="0">
+                <a:solidFill>
+                  <a:srgbClr val="4F42E6"/>
+                </a:solidFill>
+                <a:latin typeface="BM HANNA Pro OTF" panose="020B0600000101010101" pitchFamily="34" charset="-127"/>
+                <a:ea typeface="BM HANNA Pro OTF" panose="020B0600000101010101" pitchFamily="34" charset="-127"/>
+              </a:rPr>
+              <a:t>CD</a:t>
+            </a:r>
+            <a:r>
+              <a:rPr lang="ko-KR" altLang="en-US" sz="3200" dirty="0">
+                <a:solidFill>
+                  <a:srgbClr val="4F42E6"/>
+                </a:solidFill>
+                <a:latin typeface="BM HANNA Pro OTF" panose="020B0600000101010101" pitchFamily="34" charset="-127"/>
+                <a:ea typeface="BM HANNA Pro OTF" panose="020B0600000101010101" pitchFamily="34" charset="-127"/>
+              </a:rPr>
+              <a:t> </a:t>
+            </a:r>
+            <a:r>
+              <a:rPr lang="en-US" altLang="ko-KR" sz="3200" dirty="0">
+                <a:solidFill>
+                  <a:srgbClr val="4F42E6"/>
+                </a:solidFill>
+                <a:latin typeface="BM HANNA Pro OTF" panose="020B0600000101010101" pitchFamily="34" charset="-127"/>
+                <a:ea typeface="BM HANNA Pro OTF" panose="020B0600000101010101" pitchFamily="34" charset="-127"/>
+              </a:rPr>
+              <a:t>- </a:t>
+            </a:r>
+            <a:r>
+              <a:rPr lang="en-US" altLang="ko-KR" sz="3200" dirty="0" err="1">
+                <a:solidFill>
+                  <a:srgbClr val="4F42E6"/>
+                </a:solidFill>
+                <a:latin typeface="BM HANNA Pro OTF" panose="020B0600000101010101" pitchFamily="34" charset="-127"/>
+                <a:ea typeface="BM HANNA Pro OTF" panose="020B0600000101010101" pitchFamily="34" charset="-127"/>
+              </a:rPr>
+              <a:t>Github</a:t>
+            </a:r>
+            <a:r>
+              <a:rPr lang="en-US" altLang="ko-KR" sz="3200" dirty="0">
+                <a:solidFill>
+                  <a:srgbClr val="4F42E6"/>
+                </a:solidFill>
+                <a:latin typeface="BM HANNA Pro OTF" panose="020B0600000101010101" pitchFamily="34" charset="-127"/>
+                <a:ea typeface="BM HANNA Pro OTF" panose="020B0600000101010101" pitchFamily="34" charset="-127"/>
+              </a:rPr>
+              <a:t> Actions</a:t>
+            </a:r>
+            <a:endParaRPr lang="ko-KR" altLang="en-US" sz="3200" dirty="0">
+              <a:latin typeface="BM HANNA Pro OTF" panose="020B0600000101010101" pitchFamily="34" charset="-127"/>
+              <a:ea typeface="BM HANNA Pro OTF" panose="020B0600000101010101" pitchFamily="34" charset="-127"/>
+            </a:endParaRPr>
+          </a:p>
+        </p:txBody>
+      </p:sp>
+      <p:sp>
+        <p:nvSpPr>
+          <p:cNvPr id="13" name="타원 12">
             <a:extLst>
               <a:ext uri="{FF2B5EF4-FFF2-40B4-BE49-F238E27FC236}">
-                <a16:creationId xmlns:a16="http://schemas.microsoft.com/office/drawing/2014/main" id="{62722502-1B90-DE4A-9F71-4FDD099A0DF2}"/>
+                <a16:creationId xmlns:a16="http://schemas.microsoft.com/office/drawing/2014/main" id="{123873CE-014F-3449-85E8-78C6BFDB30E2}"/>
               </a:ext>
             </a:extLst>
           </p:cNvPr>
@@ -7079,7 +7172,7 @@
         </p:nvSpPr>
         <p:spPr>
           <a:xfrm>
-            <a:off x="1413408" y="2049307"/>
+            <a:off x="9052290" y="2049307"/>
             <a:ext cx="1942089" cy="1942089"/>
           </a:xfrm>
           <a:prstGeom prst="ellipse">
@@ -7123,223 +7216,6 @@
           </a:p>
         </p:txBody>
       </p:sp>
-      <p:pic>
-        <p:nvPicPr>
-          <p:cNvPr id="20" name="그래픽 19">
-            <a:extLst>
-              <a:ext uri="{FF2B5EF4-FFF2-40B4-BE49-F238E27FC236}">
-                <a16:creationId xmlns:a16="http://schemas.microsoft.com/office/drawing/2014/main" id="{20854290-B1F2-FA42-BA4B-92AC97F76F6A}"/>
-              </a:ext>
-            </a:extLst>
-          </p:cNvPr>
-          <p:cNvPicPr>
-            <a:picLocks noChangeAspect="1"/>
-          </p:cNvPicPr>
-          <p:nvPr/>
-        </p:nvPicPr>
-        <p:blipFill>
-          <a:blip r:embed="rId2">
-            <a:extLst>
-              <a:ext uri="{28A0092B-C50C-407E-A947-70E740481C1C}">
-                <a14:useLocalDpi xmlns:a14="http://schemas.microsoft.com/office/drawing/2010/main" val="0"/>
-              </a:ext>
-              <a:ext uri="{96DAC541-7B7A-43D3-8B79-37D633B846F1}">
-                <asvg:svgBlip xmlns:asvg="http://schemas.microsoft.com/office/drawing/2016/SVG/main" r:embed="rId3"/>
-              </a:ext>
-            </a:extLst>
-          </a:blip>
-          <a:stretch>
-            <a:fillRect/>
-          </a:stretch>
-        </p:blipFill>
-        <p:spPr>
-          <a:xfrm>
-            <a:off x="1895085" y="2427608"/>
-            <a:ext cx="978735" cy="1185484"/>
-          </a:xfrm>
-          <a:prstGeom prst="rect">
-            <a:avLst/>
-          </a:prstGeom>
-        </p:spPr>
-      </p:pic>
-      <p:sp>
-        <p:nvSpPr>
-          <p:cNvPr id="21" name="직사각형 20">
-            <a:extLst>
-              <a:ext uri="{FF2B5EF4-FFF2-40B4-BE49-F238E27FC236}">
-                <a16:creationId xmlns:a16="http://schemas.microsoft.com/office/drawing/2014/main" id="{97B948C4-AAAE-C846-AFA9-1E6E8095CD3B}"/>
-              </a:ext>
-            </a:extLst>
-          </p:cNvPr>
-          <p:cNvSpPr/>
-          <p:nvPr/>
-        </p:nvSpPr>
-        <p:spPr>
-          <a:xfrm>
-            <a:off x="1781394" y="4503201"/>
-            <a:ext cx="1092426" cy="523220"/>
-          </a:xfrm>
-          <a:prstGeom prst="rect">
-            <a:avLst/>
-          </a:prstGeom>
-        </p:spPr>
-        <p:txBody>
-          <a:bodyPr wrap="square">
-            <a:spAutoFit/>
-          </a:bodyPr>
-          <a:lstStyle/>
-          <a:p>
-            <a:pPr algn="ctr"/>
-            <a:r>
-              <a:rPr kumimoji="1" lang="en-US" altLang="ko-KR" sz="2800" dirty="0">
-                <a:solidFill>
-                  <a:srgbClr val="4F42E6"/>
-                </a:solidFill>
-                <a:latin typeface="BM HANNA Pro OTF" panose="020B0600000101010101" pitchFamily="34" charset="-127"/>
-                <a:ea typeface="BM HANNA Pro OTF" panose="020B0600000101010101" pitchFamily="34" charset="-127"/>
-              </a:rPr>
-              <a:t>S3</a:t>
-            </a:r>
-          </a:p>
-        </p:txBody>
-      </p:sp>
-      <p:sp>
-        <p:nvSpPr>
-          <p:cNvPr id="4" name="TextBox 3"/>
-          <p:cNvSpPr txBox="1"/>
-          <p:nvPr/>
-        </p:nvSpPr>
-        <p:spPr>
-          <a:xfrm>
-            <a:off x="624253" y="571501"/>
-            <a:ext cx="3837910" cy="584775"/>
-          </a:xfrm>
-          <a:prstGeom prst="rect">
-            <a:avLst/>
-          </a:prstGeom>
-          <a:noFill/>
-        </p:spPr>
-        <p:txBody>
-          <a:bodyPr wrap="none" rtlCol="0">
-            <a:spAutoFit/>
-          </a:bodyPr>
-          <a:lstStyle/>
-          <a:p>
-            <a:r>
-              <a:rPr lang="en-US" altLang="ko-KR" sz="3200" dirty="0">
-                <a:solidFill>
-                  <a:srgbClr val="4F42E6"/>
-                </a:solidFill>
-                <a:latin typeface="BM HANNA Pro OTF" panose="020B0600000101010101" pitchFamily="34" charset="-127"/>
-                <a:ea typeface="BM HANNA Pro OTF" panose="020B0600000101010101" pitchFamily="34" charset="-127"/>
-              </a:rPr>
-              <a:t>CD</a:t>
-            </a:r>
-            <a:r>
-              <a:rPr lang="ko-KR" altLang="en-US" sz="3200" dirty="0">
-                <a:solidFill>
-                  <a:srgbClr val="4F42E6"/>
-                </a:solidFill>
-                <a:latin typeface="BM HANNA Pro OTF" panose="020B0600000101010101" pitchFamily="34" charset="-127"/>
-                <a:ea typeface="BM HANNA Pro OTF" panose="020B0600000101010101" pitchFamily="34" charset="-127"/>
-              </a:rPr>
-              <a:t> </a:t>
-            </a:r>
-            <a:r>
-              <a:rPr lang="en-US" altLang="ko-KR" sz="3200" dirty="0">
-                <a:solidFill>
-                  <a:srgbClr val="4F42E6"/>
-                </a:solidFill>
-                <a:latin typeface="BM HANNA Pro OTF" panose="020B0600000101010101" pitchFamily="34" charset="-127"/>
-                <a:ea typeface="BM HANNA Pro OTF" panose="020B0600000101010101" pitchFamily="34" charset="-127"/>
-              </a:rPr>
-              <a:t>- </a:t>
-            </a:r>
-            <a:r>
-              <a:rPr lang="en-US" altLang="ko-KR" sz="3200" dirty="0" err="1">
-                <a:solidFill>
-                  <a:srgbClr val="4F42E6"/>
-                </a:solidFill>
-                <a:latin typeface="BM HANNA Pro OTF" panose="020B0600000101010101" pitchFamily="34" charset="-127"/>
-                <a:ea typeface="BM HANNA Pro OTF" panose="020B0600000101010101" pitchFamily="34" charset="-127"/>
-              </a:rPr>
-              <a:t>Github</a:t>
-            </a:r>
-            <a:r>
-              <a:rPr lang="en-US" altLang="ko-KR" sz="3200" dirty="0">
-                <a:solidFill>
-                  <a:srgbClr val="4F42E6"/>
-                </a:solidFill>
-                <a:latin typeface="BM HANNA Pro OTF" panose="020B0600000101010101" pitchFamily="34" charset="-127"/>
-                <a:ea typeface="BM HANNA Pro OTF" panose="020B0600000101010101" pitchFamily="34" charset="-127"/>
-              </a:rPr>
-              <a:t> Actions</a:t>
-            </a:r>
-            <a:endParaRPr lang="ko-KR" altLang="en-US" sz="3200" dirty="0">
-              <a:latin typeface="BM HANNA Pro OTF" panose="020B0600000101010101" pitchFamily="34" charset="-127"/>
-              <a:ea typeface="BM HANNA Pro OTF" panose="020B0600000101010101" pitchFamily="34" charset="-127"/>
-            </a:endParaRPr>
-          </a:p>
-        </p:txBody>
-      </p:sp>
-      <p:sp>
-        <p:nvSpPr>
-          <p:cNvPr id="13" name="타원 12">
-            <a:extLst>
-              <a:ext uri="{FF2B5EF4-FFF2-40B4-BE49-F238E27FC236}">
-                <a16:creationId xmlns:a16="http://schemas.microsoft.com/office/drawing/2014/main" id="{123873CE-014F-3449-85E8-78C6BFDB30E2}"/>
-              </a:ext>
-            </a:extLst>
-          </p:cNvPr>
-          <p:cNvSpPr/>
-          <p:nvPr/>
-        </p:nvSpPr>
-        <p:spPr>
-          <a:xfrm>
-            <a:off x="9052290" y="2049307"/>
-            <a:ext cx="1942089" cy="1942089"/>
-          </a:xfrm>
-          <a:prstGeom prst="ellipse">
-            <a:avLst/>
-          </a:prstGeom>
-          <a:solidFill>
-            <a:schemeClr val="bg1"/>
-          </a:solidFill>
-          <a:ln>
-            <a:solidFill>
-              <a:srgbClr val="4F42E6"/>
-            </a:solidFill>
-          </a:ln>
-        </p:spPr>
-        <p:style>
-          <a:lnRef idx="2">
-            <a:schemeClr val="accent6"/>
-          </a:lnRef>
-          <a:fillRef idx="1">
-            <a:schemeClr val="lt1"/>
-          </a:fillRef>
-          <a:effectRef idx="0">
-            <a:schemeClr val="accent6"/>
-          </a:effectRef>
-          <a:fontRef idx="minor">
-            <a:schemeClr val="dk1"/>
-          </a:fontRef>
-        </p:style>
-        <p:txBody>
-          <a:bodyPr rtlCol="0" anchor="ctr"/>
-          <a:lstStyle/>
-          <a:p>
-            <a:pPr algn="ctr"/>
-            <a:endParaRPr kumimoji="1" lang="en-US" altLang="ko-KR" sz="3600" dirty="0">
-              <a:solidFill>
-                <a:srgbClr val="4F42E6"/>
-              </a:solidFill>
-              <a:latin typeface="BM HANNA Pro OTF" panose="020B0600000101010101" pitchFamily="34" charset="-127"/>
-              <a:ea typeface="BM HANNA Pro OTF" panose="020B0600000101010101" pitchFamily="34" charset="-127"/>
-            </a:endParaRPr>
-          </a:p>
-        </p:txBody>
-      </p:sp>
       <p:sp>
         <p:nvSpPr>
           <p:cNvPr id="18" name="TextBox 17">
@@ -7355,7 +7231,7 @@
         <p:spPr>
           <a:xfrm>
             <a:off x="3890998" y="3782869"/>
-            <a:ext cx="4410004" cy="646331"/>
+            <a:ext cx="4410004" cy="1200329"/>
           </a:xfrm>
           <a:prstGeom prst="rect">
             <a:avLst/>
@@ -7370,11 +7246,32 @@
           <a:p>
             <a:pPr algn="ctr"/>
             <a:r>
+              <a:rPr lang="en-US" altLang="ko-KR" sz="3600" dirty="0">
+                <a:latin typeface="BM HANNA Pro OTF" panose="020B0600000101010101" pitchFamily="34" charset="-127"/>
+                <a:ea typeface="BM HANNA Pro OTF" panose="020B0600000101010101" pitchFamily="34" charset="-127"/>
+              </a:rPr>
+              <a:t>S3</a:t>
+            </a:r>
+            <a:r>
               <a:rPr lang="ko-KR" altLang="en-US" sz="3600" dirty="0">
                 <a:latin typeface="BM HANNA Pro OTF" panose="020B0600000101010101" pitchFamily="34" charset="-127"/>
                 <a:ea typeface="BM HANNA Pro OTF" panose="020B0600000101010101" pitchFamily="34" charset="-127"/>
               </a:rPr>
-              <a:t>업로드 이벤트를 전달</a:t>
+              <a:t>에 업로드한</a:t>
+            </a:r>
+            <a:endParaRPr lang="en-US" altLang="ko-KR" sz="3600" dirty="0">
+              <a:latin typeface="BM HANNA Pro OTF" panose="020B0600000101010101" pitchFamily="34" charset="-127"/>
+              <a:ea typeface="BM HANNA Pro OTF" panose="020B0600000101010101" pitchFamily="34" charset="-127"/>
+            </a:endParaRPr>
+          </a:p>
+          <a:p>
+            <a:pPr algn="ctr"/>
+            <a:r>
+              <a:rPr lang="ko-KR" altLang="en-US" sz="3600" dirty="0">
+                <a:latin typeface="BM HANNA Pro OTF" panose="020B0600000101010101" pitchFamily="34" charset="-127"/>
+                <a:ea typeface="BM HANNA Pro OTF" panose="020B0600000101010101" pitchFamily="34" charset="-127"/>
+              </a:rPr>
+              <a:t>압축 파일 키 전송</a:t>
             </a:r>
             <a:endParaRPr lang="en-US" altLang="ko-KR" sz="3600" dirty="0">
               <a:latin typeface="BM HANNA Pro OTF" panose="020B0600000101010101" pitchFamily="34" charset="-127"/>
@@ -7442,13 +7339,13 @@
           <p:nvPr/>
         </p:nvPicPr>
         <p:blipFill>
-          <a:blip r:embed="rId4">
+          <a:blip r:embed="rId2">
             <a:extLst>
               <a:ext uri="{28A0092B-C50C-407E-A947-70E740481C1C}">
                 <a14:useLocalDpi xmlns:a14="http://schemas.microsoft.com/office/drawing/2010/main" val="0"/>
               </a:ext>
               <a:ext uri="{96DAC541-7B7A-43D3-8B79-37D633B846F1}">
-                <asvg:svgBlip xmlns:asvg="http://schemas.microsoft.com/office/drawing/2016/SVG/main" r:embed="rId5"/>
+                <asvg:svgBlip xmlns:asvg="http://schemas.microsoft.com/office/drawing/2016/SVG/main" r:embed="rId3"/>
               </a:ext>
             </a:extLst>
           </a:blip>
@@ -7517,6 +7414,162 @@
               </a:rPr>
               <a:t>Deploy</a:t>
             </a:r>
+          </a:p>
+        </p:txBody>
+      </p:sp>
+      <p:sp>
+        <p:nvSpPr>
+          <p:cNvPr id="12" name="타원 11">
+            <a:extLst>
+              <a:ext uri="{FF2B5EF4-FFF2-40B4-BE49-F238E27FC236}">
+                <a16:creationId xmlns:a16="http://schemas.microsoft.com/office/drawing/2014/main" id="{11A5A2DD-C5F5-E947-9B69-58F311930723}"/>
+              </a:ext>
+            </a:extLst>
+          </p:cNvPr>
+          <p:cNvSpPr/>
+          <p:nvPr/>
+        </p:nvSpPr>
+        <p:spPr>
+          <a:xfrm>
+            <a:off x="1416978" y="2049307"/>
+            <a:ext cx="1942089" cy="1942089"/>
+          </a:xfrm>
+          <a:prstGeom prst="ellipse">
+            <a:avLst/>
+          </a:prstGeom>
+          <a:solidFill>
+            <a:schemeClr val="bg1"/>
+          </a:solidFill>
+          <a:ln>
+            <a:solidFill>
+              <a:srgbClr val="4F42E6"/>
+            </a:solidFill>
+          </a:ln>
+        </p:spPr>
+        <p:style>
+          <a:lnRef idx="2">
+            <a:schemeClr val="accent6"/>
+          </a:lnRef>
+          <a:fillRef idx="1">
+            <a:schemeClr val="lt1"/>
+          </a:fillRef>
+          <a:effectRef idx="0">
+            <a:schemeClr val="accent6"/>
+          </a:effectRef>
+          <a:fontRef idx="minor">
+            <a:schemeClr val="dk1"/>
+          </a:fontRef>
+        </p:style>
+        <p:txBody>
+          <a:bodyPr rtlCol="0" anchor="ctr"/>
+          <a:lstStyle/>
+          <a:p>
+            <a:pPr algn="ctr"/>
+            <a:endParaRPr kumimoji="1" lang="en-US" altLang="ko-KR" sz="3600" dirty="0">
+              <a:solidFill>
+                <a:srgbClr val="4F42E6"/>
+              </a:solidFill>
+              <a:latin typeface="BM HANNA Pro OTF" panose="020B0600000101010101" pitchFamily="34" charset="-127"/>
+              <a:ea typeface="BM HANNA Pro OTF" panose="020B0600000101010101" pitchFamily="34" charset="-127"/>
+            </a:endParaRPr>
+          </a:p>
+        </p:txBody>
+      </p:sp>
+      <p:pic>
+        <p:nvPicPr>
+          <p:cNvPr id="14" name="그림 13">
+            <a:extLst>
+              <a:ext uri="{FF2B5EF4-FFF2-40B4-BE49-F238E27FC236}">
+                <a16:creationId xmlns:a16="http://schemas.microsoft.com/office/drawing/2014/main" id="{ADA757FA-CF86-A943-947D-555F03FDBA9E}"/>
+              </a:ext>
+            </a:extLst>
+          </p:cNvPr>
+          <p:cNvPicPr>
+            <a:picLocks noChangeAspect="1"/>
+          </p:cNvPicPr>
+          <p:nvPr/>
+        </p:nvPicPr>
+        <p:blipFill>
+          <a:blip r:embed="rId4"/>
+          <a:stretch>
+            <a:fillRect/>
+          </a:stretch>
+        </p:blipFill>
+        <p:spPr>
+          <a:xfrm>
+            <a:off x="1818225" y="2427611"/>
+            <a:ext cx="1130634" cy="1130634"/>
+          </a:xfrm>
+          <a:prstGeom prst="rect">
+            <a:avLst/>
+          </a:prstGeom>
+        </p:spPr>
+      </p:pic>
+      <p:sp>
+        <p:nvSpPr>
+          <p:cNvPr id="15" name="직사각형 14">
+            <a:extLst>
+              <a:ext uri="{FF2B5EF4-FFF2-40B4-BE49-F238E27FC236}">
+                <a16:creationId xmlns:a16="http://schemas.microsoft.com/office/drawing/2014/main" id="{415B95C5-28D8-D744-87A5-390E7AD2CEDA}"/>
+              </a:ext>
+            </a:extLst>
+          </p:cNvPr>
+          <p:cNvSpPr/>
+          <p:nvPr/>
+        </p:nvSpPr>
+        <p:spPr>
+          <a:xfrm>
+            <a:off x="1740805" y="4349312"/>
+            <a:ext cx="1092426" cy="830997"/>
+          </a:xfrm>
+          <a:prstGeom prst="rect">
+            <a:avLst/>
+          </a:prstGeom>
+        </p:spPr>
+        <p:txBody>
+          <a:bodyPr wrap="square">
+            <a:spAutoFit/>
+          </a:bodyPr>
+          <a:lstStyle/>
+          <a:p>
+            <a:pPr algn="ctr"/>
+            <a:r>
+              <a:rPr kumimoji="1" lang="ko-KR" altLang="en-US" sz="2800" dirty="0" err="1">
+                <a:solidFill>
+                  <a:srgbClr val="4F42E6"/>
+                </a:solidFill>
+                <a:latin typeface="BM HANNA Pro OTF" panose="020B0600000101010101" pitchFamily="34" charset="-127"/>
+                <a:ea typeface="BM HANNA Pro OTF" panose="020B0600000101010101" pitchFamily="34" charset="-127"/>
+              </a:rPr>
+              <a:t>깃허브</a:t>
+            </a:r>
+            <a:endParaRPr kumimoji="1" lang="en-US" altLang="ko-KR" sz="2800" dirty="0">
+              <a:solidFill>
+                <a:srgbClr val="4F42E6"/>
+              </a:solidFill>
+              <a:latin typeface="BM HANNA Pro OTF" panose="020B0600000101010101" pitchFamily="34" charset="-127"/>
+              <a:ea typeface="BM HANNA Pro OTF" panose="020B0600000101010101" pitchFamily="34" charset="-127"/>
+            </a:endParaRPr>
+          </a:p>
+          <a:p>
+            <a:pPr algn="ctr"/>
+            <a:r>
+              <a:rPr kumimoji="1" lang="ko-KR" altLang="en-US" sz="2800" dirty="0">
+                <a:solidFill>
+                  <a:srgbClr val="4F42E6"/>
+                </a:solidFill>
+                <a:latin typeface="BM HANNA Pro OTF" panose="020B0600000101010101" pitchFamily="34" charset="-127"/>
+                <a:ea typeface="BM HANNA Pro OTF" panose="020B0600000101010101" pitchFamily="34" charset="-127"/>
+              </a:rPr>
+              <a:t>액션</a:t>
+            </a:r>
+            <a:endParaRPr kumimoji="1" lang="en-US" altLang="ko-KR" sz="2800" dirty="0">
+              <a:solidFill>
+                <a:srgbClr val="4F42E6"/>
+              </a:solidFill>
+              <a:latin typeface="BM HANNA Pro OTF" panose="020B0600000101010101" pitchFamily="34" charset="-127"/>
+              <a:ea typeface="BM HANNA Pro OTF" panose="020B0600000101010101" pitchFamily="34" charset="-127"/>
+            </a:endParaRPr>
           </a:p>
         </p:txBody>
       </p:sp>
@@ -7853,7 +7906,7 @@
         <p:spPr>
           <a:xfrm>
             <a:off x="3890998" y="3782869"/>
-            <a:ext cx="4410004" cy="1200329"/>
+            <a:ext cx="4410004" cy="1754326"/>
           </a:xfrm>
           <a:prstGeom prst="rect">
             <a:avLst/>
@@ -7865,6 +7918,20 @@
             <a:spAutoFit/>
           </a:bodyPr>
           <a:lstStyle/>
+          <a:p>
+            <a:pPr algn="ctr"/>
+            <a:r>
+              <a:rPr lang="ko-KR" altLang="en-US" sz="3600" dirty="0">
+                <a:latin typeface="BM HANNA Pro OTF" panose="020B0600000101010101" pitchFamily="34" charset="-127"/>
+                <a:ea typeface="BM HANNA Pro OTF" panose="020B0600000101010101" pitchFamily="34" charset="-127"/>
+              </a:rPr>
+              <a:t>배포 프로세스 시작</a:t>
+            </a:r>
+            <a:endParaRPr lang="en-US" altLang="ko-KR" sz="3600" dirty="0">
+              <a:latin typeface="BM HANNA Pro OTF" panose="020B0600000101010101" pitchFamily="34" charset="-127"/>
+              <a:ea typeface="BM HANNA Pro OTF" panose="020B0600000101010101" pitchFamily="34" charset="-127"/>
+            </a:endParaRPr>
+          </a:p>
           <a:p>
             <a:pPr algn="ctr"/>
             <a:r>

</xml_diff>

<commit_message>
:hammer: 발표 자료 Copyright 년도 수정
</commit_message>
<xml_diff>
--- a/10th Node/Ten-min-Seminar/21.02.20 Continuous Deploy/Continuous Deployment.pptx
+++ b/10th Node/Ten-min-Seminar/21.02.20 Continuous Deploy/Continuous Deployment.pptx
@@ -3667,7 +3667,7 @@
         <p:spPr>
           <a:xfrm>
             <a:off x="695119" y="6399292"/>
-            <a:ext cx="3169457" cy="276999"/>
+            <a:ext cx="3312125" cy="276999"/>
           </a:xfrm>
           <a:prstGeom prst="rect">
             <a:avLst/>
@@ -3688,11 +3688,18 @@
               <a:t>ⓒ </a:t>
             </a:r>
             <a:r>
+              <a:rPr lang="en-US" altLang="ko-KR" sz="1200" b="1">
+                <a:latin typeface="굴림" panose="020B0600000101010101" pitchFamily="50" charset="-127"/>
+                <a:ea typeface="굴림" panose="020B0600000101010101" pitchFamily="50" charset="-127"/>
+              </a:rPr>
+              <a:t>2021. </a:t>
+            </a:r>
+            <a:r>
               <a:rPr lang="en-US" altLang="ko-KR" sz="1200" b="1" dirty="0">
                 <a:latin typeface="굴림" panose="020B0600000101010101" pitchFamily="50" charset="-127"/>
                 <a:ea typeface="굴림" panose="020B0600000101010101" pitchFamily="50" charset="-127"/>
               </a:rPr>
-              <a:t>2020. Mash-up-</a:t>
+              <a:t>Mash-up-</a:t>
             </a:r>
             <a:r>
               <a:rPr lang="en-US" altLang="ko-KR" sz="1200" b="1" dirty="0" err="1">

</xml_diff>